<commit_message>
changes made to the weights file
</commit_message>
<xml_diff>
--- a/microsimulation_manual/Tax Microsimulation Model July 2020.pptx
+++ b/microsimulation_manual/Tax Microsimulation Model July 2020.pptx
@@ -11367,7 +11367,7 @@
           <a:p>
             <a:fld id="{CE18CD78-0727-4E59-8DC5-77E825CD074D}" type="datetimeFigureOut">
               <a:rPr lang="en-US" smtClean="0"/>
-              <a:t>7/26/2020</a:t>
+              <a:t>7/27/2020</a:t>
             </a:fld>
             <a:endParaRPr lang="en-US"/>
           </a:p>
@@ -11781,7 +11781,7 @@
           <a:p>
             <a:fld id="{41EE8611-A651-4149-87AB-284BA6E7A909}" type="datetime1">
               <a:rPr lang="en-US" smtClean="0"/>
-              <a:t>7/26/2020</a:t>
+              <a:t>7/27/2020</a:t>
             </a:fld>
             <a:endParaRPr lang="en-US"/>
           </a:p>
@@ -11984,7 +11984,7 @@
           <a:p>
             <a:fld id="{287A6877-944E-4106-A636-12A3BCA8DFA8}" type="datetime1">
               <a:rPr lang="en-US" smtClean="0"/>
-              <a:t>7/26/2020</a:t>
+              <a:t>7/27/2020</a:t>
             </a:fld>
             <a:endParaRPr lang="en-US"/>
           </a:p>
@@ -12193,7 +12193,7 @@
           <a:p>
             <a:fld id="{287A6877-944E-4106-A636-12A3BCA8DFA8}" type="datetime1">
               <a:rPr lang="en-US" smtClean="0"/>
-              <a:t>7/26/2020</a:t>
+              <a:t>7/27/2020</a:t>
             </a:fld>
             <a:endParaRPr lang="en-US"/>
           </a:p>
@@ -12381,7 +12381,7 @@
           <a:p>
             <a:fld id="{287A6877-944E-4106-A636-12A3BCA8DFA8}" type="datetime1">
               <a:rPr lang="en-US" smtClean="0"/>
-              <a:t>7/26/2020</a:t>
+              <a:t>7/27/2020</a:t>
             </a:fld>
             <a:endParaRPr lang="en-US"/>
           </a:p>
@@ -12928,7 +12928,7 @@
           <a:p>
             <a:fld id="{287A6877-944E-4106-A636-12A3BCA8DFA8}" type="datetime1">
               <a:rPr lang="en-US" smtClean="0"/>
-              <a:t>7/26/2020</a:t>
+              <a:t>7/27/2020</a:t>
             </a:fld>
             <a:endParaRPr lang="en-US"/>
           </a:p>
@@ -13115,7 +13115,7 @@
           <a:p>
             <a:fld id="{287A6877-944E-4106-A636-12A3BCA8DFA8}" type="datetime1">
               <a:rPr lang="en-US" smtClean="0"/>
-              <a:t>7/26/2020</a:t>
+              <a:t>7/27/2020</a:t>
             </a:fld>
             <a:endParaRPr lang="en-US"/>
           </a:p>
@@ -13391,7 +13391,7 @@
           <a:p>
             <a:fld id="{8781108C-BDF0-457E-96E8-FAFF6C4F082A}" type="datetime1">
               <a:rPr lang="en-US" smtClean="0"/>
-              <a:t>7/26/2020</a:t>
+              <a:t>7/27/2020</a:t>
             </a:fld>
             <a:endParaRPr lang="en-US"/>
           </a:p>
@@ -13656,7 +13656,7 @@
           <a:p>
             <a:fld id="{287A6877-944E-4106-A636-12A3BCA8DFA8}" type="datetime1">
               <a:rPr lang="en-US" smtClean="0"/>
-              <a:t>7/26/2020</a:t>
+              <a:t>7/27/2020</a:t>
             </a:fld>
             <a:endParaRPr lang="en-US"/>
           </a:p>
@@ -14069,7 +14069,7 @@
           <a:p>
             <a:fld id="{287A6877-944E-4106-A636-12A3BCA8DFA8}" type="datetime1">
               <a:rPr lang="en-US" smtClean="0"/>
-              <a:t>7/26/2020</a:t>
+              <a:t>7/27/2020</a:t>
             </a:fld>
             <a:endParaRPr lang="en-US"/>
           </a:p>
@@ -14211,7 +14211,7 @@
           <a:p>
             <a:fld id="{1AB0C280-1237-43FD-B5FD-0D518887BCDE}" type="datetime1">
               <a:rPr lang="en-US" smtClean="0"/>
-              <a:t>7/26/2020</a:t>
+              <a:t>7/27/2020</a:t>
             </a:fld>
             <a:endParaRPr lang="en-US"/>
           </a:p>
@@ -14324,7 +14324,7 @@
           <a:p>
             <a:fld id="{F604843D-B900-4D1C-A5B9-DEF8B6803C42}" type="datetime1">
               <a:rPr lang="en-US" smtClean="0"/>
-              <a:t>7/26/2020</a:t>
+              <a:t>7/27/2020</a:t>
             </a:fld>
             <a:endParaRPr lang="en-US"/>
           </a:p>
@@ -14640,7 +14640,7 @@
           <a:p>
             <a:fld id="{287A6877-944E-4106-A636-12A3BCA8DFA8}" type="datetime1">
               <a:rPr lang="en-US" smtClean="0"/>
-              <a:t>7/26/2020</a:t>
+              <a:t>7/27/2020</a:t>
             </a:fld>
             <a:endParaRPr lang="en-US"/>
           </a:p>
@@ -14929,7 +14929,7 @@
           <a:p>
             <a:fld id="{4C38CDF8-8721-480C-92AC-F3AF90708938}" type="datetime1">
               <a:rPr lang="en-US" smtClean="0"/>
-              <a:t>7/26/2020</a:t>
+              <a:t>7/27/2020</a:t>
             </a:fld>
             <a:endParaRPr lang="en-US"/>
           </a:p>
@@ -15170,7 +15170,7 @@
           <a:p>
             <a:fld id="{287A6877-944E-4106-A636-12A3BCA8DFA8}" type="datetime1">
               <a:rPr lang="en-US" smtClean="0"/>
-              <a:t>7/26/2020</a:t>
+              <a:t>7/27/2020</a:t>
             </a:fld>
             <a:endParaRPr lang="en-US"/>
           </a:p>
@@ -22686,7 +22686,15 @@
             </a:pPr>
             <a:r>
               <a:rPr lang="en-US" sz="2800" dirty="0"/>
-              <a:t>Making the calculator 2 read the changes/reforms made in the reform Jason file.</a:t>
+              <a:t>Making the calculator 2 read the changes/reforms made in the </a:t>
+            </a:r>
+            <a:r>
+              <a:rPr lang="en-US" sz="2800"/>
+              <a:t>reform Json </a:t>
+            </a:r>
+            <a:r>
+              <a:rPr lang="en-US" sz="2800" dirty="0"/>
+              <a:t>file.</a:t>
             </a:r>
           </a:p>
         </p:txBody>

</xml_diff>

<commit_message>
the changes made according to the new data set
</commit_message>
<xml_diff>
--- a/microsimulation_manual/Tax Microsimulation Model July 2020.pptx
+++ b/microsimulation_manual/Tax Microsimulation Model July 2020.pptx
@@ -246,6 +246,51 @@
     </p:extLst>
   </p:cmAuthor>
 </p:cmAuthorLst>
+</file>
+
+<file path=ppt/revisionInfo.xml><?xml version="1.0" encoding="utf-8"?>
+<p1510:revInfo xmlns:a="http://schemas.openxmlformats.org/drawingml/2006/main" xmlns:r="http://schemas.openxmlformats.org/officeDocument/2006/relationships" xmlns:p1510="http://schemas.microsoft.com/office/powerpoint/2015/10/main">
+  <p1510:revLst>
+    <p1510:client id="{9EFCD896-2950-48CF-B2AA-F7AA247E498D}" v="2" dt="2020-10-05T17:10:01.279"/>
+  </p1510:revLst>
+</p1510:revInfo>
+</file>
+
+<file path=ppt/changesInfos/changesInfo1.xml><?xml version="1.0" encoding="utf-8"?>
+<pc:chgInfo xmlns:a="http://schemas.openxmlformats.org/drawingml/2006/main" xmlns:r="http://schemas.openxmlformats.org/officeDocument/2006/relationships" xmlns:ac="http://schemas.microsoft.com/office/drawing/2013/main/command" xmlns:pc="http://schemas.microsoft.com/office/powerpoint/2013/main/command">
+  <pc:docChgLst>
+    <pc:chgData name="Sana Elahi" userId="957d28fc-6856-4508-a61c-f1922275ea0e" providerId="ADAL" clId="{9EFCD896-2950-48CF-B2AA-F7AA247E498D}"/>
+    <pc:docChg chg="modSld">
+      <pc:chgData name="Sana Elahi" userId="957d28fc-6856-4508-a61c-f1922275ea0e" providerId="ADAL" clId="{9EFCD896-2950-48CF-B2AA-F7AA247E498D}" dt="2020-10-05T17:10:01.278" v="1" actId="571"/>
+      <pc:docMkLst>
+        <pc:docMk/>
+      </pc:docMkLst>
+      <pc:sldChg chg="addSp modSp">
+        <pc:chgData name="Sana Elahi" userId="957d28fc-6856-4508-a61c-f1922275ea0e" providerId="ADAL" clId="{9EFCD896-2950-48CF-B2AA-F7AA247E498D}" dt="2020-10-05T17:10:01.278" v="1" actId="571"/>
+        <pc:sldMkLst>
+          <pc:docMk/>
+          <pc:sldMk cId="236644364" sldId="300"/>
+        </pc:sldMkLst>
+        <pc:picChg chg="add mod">
+          <ac:chgData name="Sana Elahi" userId="957d28fc-6856-4508-a61c-f1922275ea0e" providerId="ADAL" clId="{9EFCD896-2950-48CF-B2AA-F7AA247E498D}" dt="2020-10-05T17:09:43.134" v="0" actId="571"/>
+          <ac:picMkLst>
+            <pc:docMk/>
+            <pc:sldMk cId="236644364" sldId="300"/>
+            <ac:picMk id="8" creationId="{4782511C-7279-4659-A0D9-C268EAF8C24E}"/>
+          </ac:picMkLst>
+        </pc:picChg>
+        <pc:picChg chg="add mod">
+          <ac:chgData name="Sana Elahi" userId="957d28fc-6856-4508-a61c-f1922275ea0e" providerId="ADAL" clId="{9EFCD896-2950-48CF-B2AA-F7AA247E498D}" dt="2020-10-05T17:10:01.278" v="1" actId="571"/>
+          <ac:picMkLst>
+            <pc:docMk/>
+            <pc:sldMk cId="236644364" sldId="300"/>
+            <ac:picMk id="9" creationId="{15684988-36B9-4271-B7A6-8A8AC2D165C6}"/>
+          </ac:picMkLst>
+        </pc:picChg>
+      </pc:sldChg>
+    </pc:docChg>
+  </pc:docChgLst>
+</pc:chgInfo>
 </file>
 
 <file path=ppt/diagrams/colors1.xml><?xml version="1.0" encoding="utf-8"?>
@@ -11367,7 +11412,7 @@
           <a:p>
             <a:fld id="{CE18CD78-0727-4E59-8DC5-77E825CD074D}" type="datetimeFigureOut">
               <a:rPr lang="en-US" smtClean="0"/>
-              <a:t>7/27/2020</a:t>
+              <a:t>10/5/2020</a:t>
             </a:fld>
             <a:endParaRPr lang="en-US"/>
           </a:p>
@@ -11781,7 +11826,7 @@
           <a:p>
             <a:fld id="{41EE8611-A651-4149-87AB-284BA6E7A909}" type="datetime1">
               <a:rPr lang="en-US" smtClean="0"/>
-              <a:t>7/27/2020</a:t>
+              <a:t>10/5/2020</a:t>
             </a:fld>
             <a:endParaRPr lang="en-US"/>
           </a:p>
@@ -11984,7 +12029,7 @@
           <a:p>
             <a:fld id="{287A6877-944E-4106-A636-12A3BCA8DFA8}" type="datetime1">
               <a:rPr lang="en-US" smtClean="0"/>
-              <a:t>7/27/2020</a:t>
+              <a:t>10/5/2020</a:t>
             </a:fld>
             <a:endParaRPr lang="en-US"/>
           </a:p>
@@ -12193,7 +12238,7 @@
           <a:p>
             <a:fld id="{287A6877-944E-4106-A636-12A3BCA8DFA8}" type="datetime1">
               <a:rPr lang="en-US" smtClean="0"/>
-              <a:t>7/27/2020</a:t>
+              <a:t>10/5/2020</a:t>
             </a:fld>
             <a:endParaRPr lang="en-US"/>
           </a:p>
@@ -12381,7 +12426,7 @@
           <a:p>
             <a:fld id="{287A6877-944E-4106-A636-12A3BCA8DFA8}" type="datetime1">
               <a:rPr lang="en-US" smtClean="0"/>
-              <a:t>7/27/2020</a:t>
+              <a:t>10/5/2020</a:t>
             </a:fld>
             <a:endParaRPr lang="en-US"/>
           </a:p>
@@ -12928,7 +12973,7 @@
           <a:p>
             <a:fld id="{287A6877-944E-4106-A636-12A3BCA8DFA8}" type="datetime1">
               <a:rPr lang="en-US" smtClean="0"/>
-              <a:t>7/27/2020</a:t>
+              <a:t>10/5/2020</a:t>
             </a:fld>
             <a:endParaRPr lang="en-US"/>
           </a:p>
@@ -13115,7 +13160,7 @@
           <a:p>
             <a:fld id="{287A6877-944E-4106-A636-12A3BCA8DFA8}" type="datetime1">
               <a:rPr lang="en-US" smtClean="0"/>
-              <a:t>7/27/2020</a:t>
+              <a:t>10/5/2020</a:t>
             </a:fld>
             <a:endParaRPr lang="en-US"/>
           </a:p>
@@ -13391,7 +13436,7 @@
           <a:p>
             <a:fld id="{8781108C-BDF0-457E-96E8-FAFF6C4F082A}" type="datetime1">
               <a:rPr lang="en-US" smtClean="0"/>
-              <a:t>7/27/2020</a:t>
+              <a:t>10/5/2020</a:t>
             </a:fld>
             <a:endParaRPr lang="en-US"/>
           </a:p>
@@ -13656,7 +13701,7 @@
           <a:p>
             <a:fld id="{287A6877-944E-4106-A636-12A3BCA8DFA8}" type="datetime1">
               <a:rPr lang="en-US" smtClean="0"/>
-              <a:t>7/27/2020</a:t>
+              <a:t>10/5/2020</a:t>
             </a:fld>
             <a:endParaRPr lang="en-US"/>
           </a:p>
@@ -14069,7 +14114,7 @@
           <a:p>
             <a:fld id="{287A6877-944E-4106-A636-12A3BCA8DFA8}" type="datetime1">
               <a:rPr lang="en-US" smtClean="0"/>
-              <a:t>7/27/2020</a:t>
+              <a:t>10/5/2020</a:t>
             </a:fld>
             <a:endParaRPr lang="en-US"/>
           </a:p>
@@ -14211,7 +14256,7 @@
           <a:p>
             <a:fld id="{1AB0C280-1237-43FD-B5FD-0D518887BCDE}" type="datetime1">
               <a:rPr lang="en-US" smtClean="0"/>
-              <a:t>7/27/2020</a:t>
+              <a:t>10/5/2020</a:t>
             </a:fld>
             <a:endParaRPr lang="en-US"/>
           </a:p>
@@ -14324,7 +14369,7 @@
           <a:p>
             <a:fld id="{F604843D-B900-4D1C-A5B9-DEF8B6803C42}" type="datetime1">
               <a:rPr lang="en-US" smtClean="0"/>
-              <a:t>7/27/2020</a:t>
+              <a:t>10/5/2020</a:t>
             </a:fld>
             <a:endParaRPr lang="en-US"/>
           </a:p>
@@ -14640,7 +14685,7 @@
           <a:p>
             <a:fld id="{287A6877-944E-4106-A636-12A3BCA8DFA8}" type="datetime1">
               <a:rPr lang="en-US" smtClean="0"/>
-              <a:t>7/27/2020</a:t>
+              <a:t>10/5/2020</a:t>
             </a:fld>
             <a:endParaRPr lang="en-US"/>
           </a:p>
@@ -14929,7 +14974,7 @@
           <a:p>
             <a:fld id="{4C38CDF8-8721-480C-92AC-F3AF90708938}" type="datetime1">
               <a:rPr lang="en-US" smtClean="0"/>
-              <a:t>7/27/2020</a:t>
+              <a:t>10/5/2020</a:t>
             </a:fld>
             <a:endParaRPr lang="en-US"/>
           </a:p>
@@ -15170,7 +15215,7 @@
           <a:p>
             <a:fld id="{287A6877-944E-4106-A636-12A3BCA8DFA8}" type="datetime1">
               <a:rPr lang="en-US" smtClean="0"/>
-              <a:t>7/27/2020</a:t>
+              <a:t>10/5/2020</a:t>
             </a:fld>
             <a:endParaRPr lang="en-US"/>
           </a:p>
@@ -16281,6 +16326,67 @@
           </a:p>
         </p:txBody>
       </p:sp>
+      <p:pic>
+        <p:nvPicPr>
+          <p:cNvPr id="8" name="Picture 7">
+            <a:extLst>
+              <a:ext uri="{FF2B5EF4-FFF2-40B4-BE49-F238E27FC236}">
+                <a16:creationId xmlns:a16="http://schemas.microsoft.com/office/drawing/2014/main" id="{4782511C-7279-4659-A0D9-C268EAF8C24E}"/>
+              </a:ext>
+            </a:extLst>
+          </p:cNvPr>
+          <p:cNvPicPr>
+            <a:picLocks noChangeAspect="1"/>
+          </p:cNvPicPr>
+          <p:nvPr/>
+        </p:nvPicPr>
+        <p:blipFill>
+          <a:blip r:embed="rId2"/>
+          <a:stretch>
+            <a:fillRect/>
+          </a:stretch>
+        </p:blipFill>
+        <p:spPr>
+          <a:xfrm>
+            <a:off x="804672" y="887340"/>
+            <a:ext cx="3026664" cy="2269998"/>
+          </a:xfrm>
+          <a:prstGeom prst="rect">
+            <a:avLst/>
+          </a:prstGeom>
+          <a:effectLst/>
+        </p:spPr>
+      </p:pic>
+      <p:pic>
+        <p:nvPicPr>
+          <p:cNvPr id="9" name="Picture 8">
+            <a:extLst>
+              <a:ext uri="{FF2B5EF4-FFF2-40B4-BE49-F238E27FC236}">
+                <a16:creationId xmlns:a16="http://schemas.microsoft.com/office/drawing/2014/main" id="{15684988-36B9-4271-B7A6-8A8AC2D165C6}"/>
+              </a:ext>
+            </a:extLst>
+          </p:cNvPr>
+          <p:cNvPicPr>
+            <a:picLocks noChangeAspect="1"/>
+          </p:cNvPicPr>
+          <p:nvPr/>
+        </p:nvPicPr>
+        <p:blipFill>
+          <a:blip r:embed="rId3"/>
+          <a:stretch>
+            <a:fillRect/>
+          </a:stretch>
+        </p:blipFill>
+        <p:spPr>
+          <a:xfrm>
+            <a:off x="957072" y="3744608"/>
+            <a:ext cx="3026663" cy="2378452"/>
+          </a:xfrm>
+          <a:prstGeom prst="rect">
+            <a:avLst/>
+          </a:prstGeom>
+        </p:spPr>
+      </p:pic>
     </p:spTree>
     <p:extLst>
       <p:ext uri="{BB962C8B-B14F-4D97-AF65-F5344CB8AC3E}">

</xml_diff>